<commit_message>
minor edits (figures order, results...)
</commit_message>
<xml_diff>
--- a/manuscript/manuscript_V1/FigureS1.pptx
+++ b/manuscript/manuscript_V1/FigureS1.pptx
@@ -104,6 +104,22 @@
       </a:defRPr>
     </a:lvl9pPr>
   </p:defaultTextStyle>
+  <p:extLst>
+    <p:ext uri="{EFAFB233-063F-42B5-8137-9DF3F51BA10A}">
+      <p15:sldGuideLst xmlns:p15="http://schemas.microsoft.com/office/powerpoint/2012/main">
+        <p15:guide id="1" orient="horz" pos="2160">
+          <p15:clr>
+            <a:srgbClr val="A4A3A4"/>
+          </p15:clr>
+        </p15:guide>
+        <p15:guide id="2" pos="2880">
+          <p15:clr>
+            <a:srgbClr val="A4A3A4"/>
+          </p15:clr>
+        </p15:guide>
+      </p15:sldGuideLst>
+    </p:ext>
+  </p:extLst>
 </p:presentation>
 </file>
 
@@ -288,7 +304,7 @@
           <a:p>
             <a:fld id="{127C75EE-A64A-0E42-961D-1D4A99D828FE}" type="datetimeFigureOut">
               <a:rPr lang="en-US" smtClean="0"/>
-              <a:t>9/17/15</a:t>
+              <a:t>10/1/15</a:t>
             </a:fld>
             <a:endParaRPr lang="en-US"/>
           </a:p>
@@ -458,7 +474,7 @@
           <a:p>
             <a:fld id="{127C75EE-A64A-0E42-961D-1D4A99D828FE}" type="datetimeFigureOut">
               <a:rPr lang="en-US" smtClean="0"/>
-              <a:t>9/17/15</a:t>
+              <a:t>10/1/15</a:t>
             </a:fld>
             <a:endParaRPr lang="en-US"/>
           </a:p>
@@ -638,7 +654,7 @@
           <a:p>
             <a:fld id="{127C75EE-A64A-0E42-961D-1D4A99D828FE}" type="datetimeFigureOut">
               <a:rPr lang="en-US" smtClean="0"/>
-              <a:t>9/17/15</a:t>
+              <a:t>10/1/15</a:t>
             </a:fld>
             <a:endParaRPr lang="en-US"/>
           </a:p>
@@ -808,7 +824,7 @@
           <a:p>
             <a:fld id="{127C75EE-A64A-0E42-961D-1D4A99D828FE}" type="datetimeFigureOut">
               <a:rPr lang="en-US" smtClean="0"/>
-              <a:t>9/17/15</a:t>
+              <a:t>10/1/15</a:t>
             </a:fld>
             <a:endParaRPr lang="en-US"/>
           </a:p>
@@ -1054,7 +1070,7 @@
           <a:p>
             <a:fld id="{127C75EE-A64A-0E42-961D-1D4A99D828FE}" type="datetimeFigureOut">
               <a:rPr lang="en-US" smtClean="0"/>
-              <a:t>9/17/15</a:t>
+              <a:t>10/1/15</a:t>
             </a:fld>
             <a:endParaRPr lang="en-US"/>
           </a:p>
@@ -1342,7 +1358,7 @@
           <a:p>
             <a:fld id="{127C75EE-A64A-0E42-961D-1D4A99D828FE}" type="datetimeFigureOut">
               <a:rPr lang="en-US" smtClean="0"/>
-              <a:t>9/17/15</a:t>
+              <a:t>10/1/15</a:t>
             </a:fld>
             <a:endParaRPr lang="en-US"/>
           </a:p>
@@ -1764,7 +1780,7 @@
           <a:p>
             <a:fld id="{127C75EE-A64A-0E42-961D-1D4A99D828FE}" type="datetimeFigureOut">
               <a:rPr lang="en-US" smtClean="0"/>
-              <a:t>9/17/15</a:t>
+              <a:t>10/1/15</a:t>
             </a:fld>
             <a:endParaRPr lang="en-US"/>
           </a:p>
@@ -1882,7 +1898,7 @@
           <a:p>
             <a:fld id="{127C75EE-A64A-0E42-961D-1D4A99D828FE}" type="datetimeFigureOut">
               <a:rPr lang="en-US" smtClean="0"/>
-              <a:t>9/17/15</a:t>
+              <a:t>10/1/15</a:t>
             </a:fld>
             <a:endParaRPr lang="en-US"/>
           </a:p>
@@ -1977,7 +1993,7 @@
           <a:p>
             <a:fld id="{127C75EE-A64A-0E42-961D-1D4A99D828FE}" type="datetimeFigureOut">
               <a:rPr lang="en-US" smtClean="0"/>
-              <a:t>9/17/15</a:t>
+              <a:t>10/1/15</a:t>
             </a:fld>
             <a:endParaRPr lang="en-US"/>
           </a:p>
@@ -2254,7 +2270,7 @@
           <a:p>
             <a:fld id="{127C75EE-A64A-0E42-961D-1D4A99D828FE}" type="datetimeFigureOut">
               <a:rPr lang="en-US" smtClean="0"/>
-              <a:t>9/17/15</a:t>
+              <a:t>10/1/15</a:t>
             </a:fld>
             <a:endParaRPr lang="en-US"/>
           </a:p>
@@ -2507,7 +2523,7 @@
           <a:p>
             <a:fld id="{127C75EE-A64A-0E42-961D-1D4A99D828FE}" type="datetimeFigureOut">
               <a:rPr lang="en-US" smtClean="0"/>
-              <a:t>9/17/15</a:t>
+              <a:t>10/1/15</a:t>
             </a:fld>
             <a:endParaRPr lang="en-US"/>
           </a:p>
@@ -2720,7 +2736,7 @@
           <a:p>
             <a:fld id="{127C75EE-A64A-0E42-961D-1D4A99D828FE}" type="datetimeFigureOut">
               <a:rPr lang="en-US" smtClean="0"/>
-              <a:t>9/17/15</a:t>
+              <a:t>10/1/15</a:t>
             </a:fld>
             <a:endParaRPr lang="en-US"/>
           </a:p>
@@ -3105,13 +3121,13 @@
         </p:nvPicPr>
         <p:blipFill rotWithShape="1">
           <a:blip r:embed="rId2"/>
-          <a:srcRect t="6711" r="20511" b="14430"/>
+          <a:srcRect l="26732" t="36140" r="49779" b="40981"/>
           <a:stretch/>
         </p:blipFill>
         <p:spPr>
           <a:xfrm>
-            <a:off x="1922441" y="1297111"/>
-            <a:ext cx="2745586" cy="2550804"/>
+            <a:off x="3262187" y="2720390"/>
+            <a:ext cx="1459832" cy="1331494"/>
           </a:xfrm>
           <a:prstGeom prst="rect">
             <a:avLst/>
@@ -3128,13 +3144,13 @@
         </p:nvPicPr>
         <p:blipFill rotWithShape="1">
           <a:blip r:embed="rId3"/>
-          <a:srcRect l="19146" t="26711" r="37056" b="24262"/>
+          <a:srcRect l="34691" t="45084" r="52770" b="40718"/>
           <a:stretch/>
         </p:blipFill>
         <p:spPr>
           <a:xfrm>
-            <a:off x="4668027" y="1297111"/>
-            <a:ext cx="2745586" cy="2550804"/>
+            <a:off x="4722018" y="2720390"/>
+            <a:ext cx="1416743" cy="1331494"/>
           </a:xfrm>
           <a:prstGeom prst="rect">
             <a:avLst/>
@@ -3149,17 +3165,18 @@
         </p:nvCxnSpPr>
         <p:spPr>
           <a:xfrm>
-            <a:off x="5818292" y="3619971"/>
-            <a:ext cx="385354" cy="0"/>
+            <a:off x="4212682" y="3978160"/>
+            <a:ext cx="444531" cy="0"/>
           </a:xfrm>
           <a:prstGeom prst="line">
             <a:avLst/>
           </a:prstGeom>
-          <a:ln>
+          <a:ln w="19050">
             <a:solidFill>
               <a:schemeClr val="bg1"/>
             </a:solidFill>
           </a:ln>
+          <a:effectLst/>
         </p:spPr>
         <p:style>
           <a:lnRef idx="2">
@@ -3184,8 +3201,8 @@
         </p:nvSpPr>
         <p:spPr>
           <a:xfrm>
-            <a:off x="5679458" y="3245213"/>
-            <a:ext cx="665154" cy="369332"/>
+            <a:off x="4128464" y="3630779"/>
+            <a:ext cx="668650" cy="338554"/>
           </a:xfrm>
           <a:prstGeom prst="rect">
             <a:avLst/>
@@ -3193,20 +3210,20 @@
           <a:noFill/>
         </p:spPr>
         <p:txBody>
-          <a:bodyPr wrap="none" rtlCol="0">
+          <a:bodyPr wrap="square" rtlCol="0">
             <a:spAutoFit/>
           </a:bodyPr>
           <a:lstStyle/>
           <a:p>
             <a:r>
-              <a:rPr lang="en-US" dirty="0" smtClean="0">
+              <a:rPr lang="en-US" sz="1600" dirty="0" smtClean="0">
                 <a:solidFill>
                   <a:schemeClr val="bg1"/>
                 </a:solidFill>
               </a:rPr>
               <a:t>5 µm </a:t>
             </a:r>
-            <a:endParaRPr lang="en-US" dirty="0">
+            <a:endParaRPr lang="en-US" sz="1600" dirty="0">
               <a:solidFill>
                 <a:schemeClr val="bg1"/>
               </a:solidFill>
@@ -3227,7 +3244,7 @@
   <p:timing>
     <p:tnLst>
       <p:par>
-        <p:cTn xmlns:p14="http://schemas.microsoft.com/office/powerpoint/2010/main" id="1" dur="indefinite" restart="never" nodeType="tmRoot"/>
+        <p:cTn id="1" dur="indefinite" restart="never" nodeType="tmRoot"/>
       </p:par>
     </p:tnLst>
   </p:timing>

</xml_diff>